<commit_message>
se realizo todas las clases para la otra semana de computacion aplicada 2
</commit_message>
<xml_diff>
--- a/2015-2016/clases/informatica_basica/clase_4/clase_4.pptx
+++ b/2015-2016/clases/informatica_basica/clase_4/clase_4.pptx
@@ -289,7 +289,7 @@
           <a:p>
             <a:fld id="{7A847CFC-816F-41D0-AAC0-9BF4FEBC753E}" type="datetimeFigureOut">
               <a:rPr lang="es-ES" smtClean="0"/>
-              <a:t>20/05/2015</a:t>
+              <a:t>23/05/2015</a:t>
             </a:fld>
             <a:endParaRPr lang="es-ES"/>
           </a:p>
@@ -454,7 +454,7 @@
           <a:p>
             <a:fld id="{7A847CFC-816F-41D0-AAC0-9BF4FEBC753E}" type="datetimeFigureOut">
               <a:rPr lang="es-ES" smtClean="0"/>
-              <a:t>20/05/2015</a:t>
+              <a:t>23/05/2015</a:t>
             </a:fld>
             <a:endParaRPr lang="es-ES"/>
           </a:p>
@@ -629,7 +629,7 @@
           <a:p>
             <a:fld id="{7A847CFC-816F-41D0-AAC0-9BF4FEBC753E}" type="datetimeFigureOut">
               <a:rPr lang="es-ES" smtClean="0"/>
-              <a:t>20/05/2015</a:t>
+              <a:t>23/05/2015</a:t>
             </a:fld>
             <a:endParaRPr lang="es-ES"/>
           </a:p>
@@ -794,7 +794,7 @@
           <a:p>
             <a:fld id="{7A847CFC-816F-41D0-AAC0-9BF4FEBC753E}" type="datetimeFigureOut">
               <a:rPr lang="es-ES" smtClean="0"/>
-              <a:t>20/05/2015</a:t>
+              <a:t>23/05/2015</a:t>
             </a:fld>
             <a:endParaRPr lang="es-ES"/>
           </a:p>
@@ -1035,7 +1035,7 @@
           <a:p>
             <a:fld id="{7A847CFC-816F-41D0-AAC0-9BF4FEBC753E}" type="datetimeFigureOut">
               <a:rPr lang="es-ES" smtClean="0"/>
-              <a:t>20/05/2015</a:t>
+              <a:t>23/05/2015</a:t>
             </a:fld>
             <a:endParaRPr lang="es-ES"/>
           </a:p>
@@ -1318,7 +1318,7 @@
           <a:p>
             <a:fld id="{7A847CFC-816F-41D0-AAC0-9BF4FEBC753E}" type="datetimeFigureOut">
               <a:rPr lang="es-ES" smtClean="0"/>
-              <a:t>20/05/2015</a:t>
+              <a:t>23/05/2015</a:t>
             </a:fld>
             <a:endParaRPr lang="es-ES"/>
           </a:p>
@@ -1735,7 +1735,7 @@
           <a:p>
             <a:fld id="{7A847CFC-816F-41D0-AAC0-9BF4FEBC753E}" type="datetimeFigureOut">
               <a:rPr lang="es-ES" smtClean="0"/>
-              <a:t>20/05/2015</a:t>
+              <a:t>23/05/2015</a:t>
             </a:fld>
             <a:endParaRPr lang="es-ES"/>
           </a:p>
@@ -1848,7 +1848,7 @@
           <a:p>
             <a:fld id="{7A847CFC-816F-41D0-AAC0-9BF4FEBC753E}" type="datetimeFigureOut">
               <a:rPr lang="es-ES" smtClean="0"/>
-              <a:t>20/05/2015</a:t>
+              <a:t>23/05/2015</a:t>
             </a:fld>
             <a:endParaRPr lang="es-ES"/>
           </a:p>
@@ -1938,7 +1938,7 @@
           <a:p>
             <a:fld id="{7A847CFC-816F-41D0-AAC0-9BF4FEBC753E}" type="datetimeFigureOut">
               <a:rPr lang="es-ES" smtClean="0"/>
-              <a:t>20/05/2015</a:t>
+              <a:t>23/05/2015</a:t>
             </a:fld>
             <a:endParaRPr lang="es-ES"/>
           </a:p>
@@ -2210,7 +2210,7 @@
           <a:p>
             <a:fld id="{7A847CFC-816F-41D0-AAC0-9BF4FEBC753E}" type="datetimeFigureOut">
               <a:rPr lang="es-ES" smtClean="0"/>
-              <a:t>20/05/2015</a:t>
+              <a:t>23/05/2015</a:t>
             </a:fld>
             <a:endParaRPr lang="es-ES"/>
           </a:p>
@@ -2458,7 +2458,7 @@
           <a:p>
             <a:fld id="{7A847CFC-816F-41D0-AAC0-9BF4FEBC753E}" type="datetimeFigureOut">
               <a:rPr lang="es-ES" smtClean="0"/>
-              <a:t>20/05/2015</a:t>
+              <a:t>23/05/2015</a:t>
             </a:fld>
             <a:endParaRPr lang="es-ES"/>
           </a:p>
@@ -2666,7 +2666,7 @@
           <a:p>
             <a:fld id="{7A847CFC-816F-41D0-AAC0-9BF4FEBC753E}" type="datetimeFigureOut">
               <a:rPr lang="es-ES" smtClean="0"/>
-              <a:t>20/05/2015</a:t>
+              <a:t>23/05/2015</a:t>
             </a:fld>
             <a:endParaRPr lang="es-ES"/>
           </a:p>
@@ -3048,7 +3048,7 @@
         </p:nvSpPr>
         <p:spPr>
           <a:xfrm>
-            <a:off x="899592" y="404665"/>
+            <a:off x="827584" y="2996952"/>
             <a:ext cx="7772400" cy="936104"/>
           </a:xfrm>
         </p:spPr>
@@ -3060,30 +3060,6 @@
               <a:rPr lang="es-ES" dirty="0" smtClean="0"/>
               <a:t>Ofimática</a:t>
             </a:r>
-            <a:endParaRPr lang="es-ES" dirty="0"/>
-          </a:p>
-        </p:txBody>
-      </p:sp>
-      <p:sp>
-        <p:nvSpPr>
-          <p:cNvPr id="3" name="2 Subtítulo"/>
-          <p:cNvSpPr>
-            <a:spLocks noGrp="1"/>
-          </p:cNvSpPr>
-          <p:nvPr>
-            <p:ph type="subTitle" idx="1"/>
-          </p:nvPr>
-        </p:nvSpPr>
-        <p:spPr>
-          <a:xfrm>
-            <a:off x="755576" y="1484784"/>
-            <a:ext cx="7848872" cy="4464496"/>
-          </a:xfrm>
-        </p:spPr>
-        <p:txBody>
-          <a:bodyPr/>
-          <a:lstStyle/>
-          <a:p>
             <a:endParaRPr lang="es-ES" dirty="0"/>
           </a:p>
         </p:txBody>

</xml_diff>

<commit_message>
se borro toda la basura
</commit_message>
<xml_diff>
--- a/2015-2016/clases/informatica_basica/clase_4/clase_4.pptx
+++ b/2015-2016/clases/informatica_basica/clase_4/clase_4.pptx
@@ -22,6 +22,7 @@
     <p:sldId id="270" r:id="rId16"/>
     <p:sldId id="271" r:id="rId17"/>
     <p:sldId id="272" r:id="rId18"/>
+    <p:sldId id="273" r:id="rId19"/>
   </p:sldIdLst>
   <p:sldSz cx="9144000" cy="6858000" type="screen4x3"/>
   <p:notesSz cx="6858000" cy="9144000"/>
@@ -4724,6 +4725,36 @@
 </p:sld>
 </file>
 
+<file path=ppt/slides/slide18.xml><?xml version="1.0" encoding="utf-8"?>
+<p:sld xmlns:a="http://schemas.openxmlformats.org/drawingml/2006/main" xmlns:r="http://schemas.openxmlformats.org/officeDocument/2006/relationships" xmlns:p="http://schemas.openxmlformats.org/presentationml/2006/main">
+  <p:cSld>
+    <p:spTree>
+      <p:nvGrpSpPr>
+        <p:cNvPr id="1" name=""/>
+        <p:cNvGrpSpPr/>
+        <p:nvPr/>
+      </p:nvGrpSpPr>
+      <p:grpSpPr>
+        <a:xfrm>
+          <a:off x="0" y="0"/>
+          <a:ext cx="0" cy="0"/>
+          <a:chOff x="0" y="0"/>
+          <a:chExt cx="0" cy="0"/>
+        </a:xfrm>
+      </p:grpSpPr>
+    </p:spTree>
+    <p:extLst>
+      <p:ext uri="{BB962C8B-B14F-4D97-AF65-F5344CB8AC3E}">
+        <p14:creationId xmlns:p14="http://schemas.microsoft.com/office/powerpoint/2010/main" val="3568534489"/>
+      </p:ext>
+    </p:extLst>
+  </p:cSld>
+  <p:clrMapOvr>
+    <a:masterClrMapping/>
+  </p:clrMapOvr>
+</p:sld>
+</file>
+
 <file path=ppt/slides/slide2.xml><?xml version="1.0" encoding="utf-8"?>
 <p:sld xmlns:a="http://schemas.openxmlformats.org/drawingml/2006/main" xmlns:r="http://schemas.openxmlformats.org/officeDocument/2006/relationships" xmlns:p="http://schemas.openxmlformats.org/presentationml/2006/main">
   <p:cSld>
@@ -6009,15 +6040,7 @@
           <a:p>
             <a:r>
               <a:rPr lang="es-EC" sz="2400" dirty="0" smtClean="0"/>
-              <a:t>Existe </a:t>
-            </a:r>
-            <a:r>
-              <a:rPr lang="es-EC" sz="2400" dirty="0" smtClean="0"/>
-              <a:t>desconcentración </a:t>
-            </a:r>
-            <a:r>
-              <a:rPr lang="es-EC" sz="2400" dirty="0" smtClean="0"/>
-              <a:t>por parte las redes sociales, debido a la conexión a internet</a:t>
+              <a:t>Existe desconcentración por parte las redes sociales, debido a la conexión a internet</a:t>
             </a:r>
             <a:endParaRPr lang="es-ES_tradnl" sz="2400" dirty="0" smtClean="0"/>
           </a:p>

</xml_diff>

<commit_message>
se subio el ararchivo
</commit_message>
<xml_diff>
--- a/2015-2016/clases/informatica_basica/clase_4/clase_4.pptx
+++ b/2015-2016/clases/informatica_basica/clase_4/clase_4.pptx
@@ -237,7 +237,7 @@
           <a:p>
             <a:fld id="{7A847CFC-816F-41D0-AAC0-9BF4FEBC753E}" type="datetimeFigureOut">
               <a:rPr lang="es-ES" smtClean="0"/>
-              <a:t>25/05/2015</a:t>
+              <a:t>26/05/2015</a:t>
             </a:fld>
             <a:endParaRPr lang="es-ES"/>
           </a:p>
@@ -463,7 +463,7 @@
           <a:p>
             <a:fld id="{7A847CFC-816F-41D0-AAC0-9BF4FEBC753E}" type="datetimeFigureOut">
               <a:rPr lang="es-ES" smtClean="0"/>
-              <a:t>25/05/2015</a:t>
+              <a:t>26/05/2015</a:t>
             </a:fld>
             <a:endParaRPr lang="es-ES"/>
           </a:p>
@@ -638,7 +638,7 @@
           <a:p>
             <a:fld id="{7A847CFC-816F-41D0-AAC0-9BF4FEBC753E}" type="datetimeFigureOut">
               <a:rPr lang="es-ES" smtClean="0"/>
-              <a:t>25/05/2015</a:t>
+              <a:t>26/05/2015</a:t>
             </a:fld>
             <a:endParaRPr lang="es-ES"/>
           </a:p>
@@ -803,7 +803,7 @@
           <a:p>
             <a:fld id="{7A847CFC-816F-41D0-AAC0-9BF4FEBC753E}" type="datetimeFigureOut">
               <a:rPr lang="es-ES" smtClean="0"/>
-              <a:t>25/05/2015</a:t>
+              <a:t>26/05/2015</a:t>
             </a:fld>
             <a:endParaRPr lang="es-ES"/>
           </a:p>
@@ -1047,7 +1047,7 @@
           <a:p>
             <a:fld id="{7A847CFC-816F-41D0-AAC0-9BF4FEBC753E}" type="datetimeFigureOut">
               <a:rPr lang="es-ES" smtClean="0"/>
-              <a:t>25/05/2015</a:t>
+              <a:t>26/05/2015</a:t>
             </a:fld>
             <a:endParaRPr lang="es-ES"/>
           </a:p>
@@ -1311,7 +1311,7 @@
           <a:p>
             <a:fld id="{7A847CFC-816F-41D0-AAC0-9BF4FEBC753E}" type="datetimeFigureOut">
               <a:rPr lang="es-ES" smtClean="0"/>
-              <a:t>25/05/2015</a:t>
+              <a:t>26/05/2015</a:t>
             </a:fld>
             <a:endParaRPr lang="es-ES"/>
           </a:p>
@@ -1685,7 +1685,7 @@
           <a:p>
             <a:fld id="{7A847CFC-816F-41D0-AAC0-9BF4FEBC753E}" type="datetimeFigureOut">
               <a:rPr lang="es-ES" smtClean="0"/>
-              <a:t>25/05/2015</a:t>
+              <a:t>26/05/2015</a:t>
             </a:fld>
             <a:endParaRPr lang="es-ES"/>
           </a:p>
@@ -1798,7 +1798,7 @@
           <a:p>
             <a:fld id="{7A847CFC-816F-41D0-AAC0-9BF4FEBC753E}" type="datetimeFigureOut">
               <a:rPr lang="es-ES" smtClean="0"/>
-              <a:t>25/05/2015</a:t>
+              <a:t>26/05/2015</a:t>
             </a:fld>
             <a:endParaRPr lang="es-ES"/>
           </a:p>
@@ -1888,7 +1888,7 @@
           <a:p>
             <a:fld id="{7A847CFC-816F-41D0-AAC0-9BF4FEBC753E}" type="datetimeFigureOut">
               <a:rPr lang="es-ES" smtClean="0"/>
-              <a:t>25/05/2015</a:t>
+              <a:t>26/05/2015</a:t>
             </a:fld>
             <a:endParaRPr lang="es-ES"/>
           </a:p>
@@ -2146,7 +2146,7 @@
           <a:p>
             <a:fld id="{7A847CFC-816F-41D0-AAC0-9BF4FEBC753E}" type="datetimeFigureOut">
               <a:rPr lang="es-ES" smtClean="0"/>
-              <a:t>25/05/2015</a:t>
+              <a:t>26/05/2015</a:t>
             </a:fld>
             <a:endParaRPr lang="es-ES"/>
           </a:p>
@@ -2410,7 +2410,7 @@
           <a:p>
             <a:fld id="{7A847CFC-816F-41D0-AAC0-9BF4FEBC753E}" type="datetimeFigureOut">
               <a:rPr lang="es-ES" smtClean="0"/>
-              <a:t>25/05/2015</a:t>
+              <a:t>26/05/2015</a:t>
             </a:fld>
             <a:endParaRPr lang="es-ES"/>
           </a:p>
@@ -2627,7 +2627,7 @@
           <a:p>
             <a:fld id="{7A847CFC-816F-41D0-AAC0-9BF4FEBC753E}" type="datetimeFigureOut">
               <a:rPr lang="es-ES" smtClean="0"/>
-              <a:t>25/05/2015</a:t>
+              <a:t>26/05/2015</a:t>
             </a:fld>
             <a:endParaRPr lang="es-ES"/>
           </a:p>
@@ -3095,6 +3095,13 @@
   <p:clrMapOvr>
     <a:masterClrMapping/>
   </p:clrMapOvr>
+  <p:timing>
+    <p:tnLst>
+      <p:par>
+        <p:cTn id="1" dur="indefinite" restart="never" nodeType="tmRoot"/>
+      </p:par>
+    </p:tnLst>
+  </p:timing>
 </p:sld>
 </file>
 
@@ -4008,6 +4015,13 @@
   <p:clrMapOvr>
     <a:masterClrMapping/>
   </p:clrMapOvr>
+  <p:timing>
+    <p:tnLst>
+      <p:par>
+        <p:cTn id="1" dur="indefinite" restart="never" nodeType="tmRoot"/>
+      </p:par>
+    </p:tnLst>
+  </p:timing>
 </p:sld>
 </file>
 
@@ -4400,6 +4414,13 @@
   <p:clrMapOvr>
     <a:masterClrMapping/>
   </p:clrMapOvr>
+  <p:timing>
+    <p:tnLst>
+      <p:par>
+        <p:cTn id="1" dur="indefinite" restart="never" nodeType="tmRoot"/>
+      </p:par>
+    </p:tnLst>
+  </p:timing>
 </p:sld>
 </file>
 
@@ -5067,6 +5088,13 @@
   <p:clrMapOvr>
     <a:masterClrMapping/>
   </p:clrMapOvr>
+  <p:timing>
+    <p:tnLst>
+      <p:par>
+        <p:cTn id="1" dur="indefinite" restart="never" nodeType="tmRoot"/>
+      </p:par>
+    </p:tnLst>
+  </p:timing>
 </p:sld>
 </file>
 
@@ -5185,6 +5213,13 @@
   <p:clrMapOvr>
     <a:masterClrMapping/>
   </p:clrMapOvr>
+  <p:timing>
+    <p:tnLst>
+      <p:par>
+        <p:cTn id="1" dur="indefinite" restart="never" nodeType="tmRoot"/>
+      </p:par>
+    </p:tnLst>
+  </p:timing>
 </p:sld>
 </file>
 
@@ -5509,6 +5544,13 @@
   <p:clrMapOvr>
     <a:masterClrMapping/>
   </p:clrMapOvr>
+  <p:timing>
+    <p:tnLst>
+      <p:par>
+        <p:cTn id="1" dur="indefinite" restart="never" nodeType="tmRoot"/>
+      </p:par>
+    </p:tnLst>
+  </p:timing>
 </p:sld>
 </file>
 
@@ -5694,6 +5736,13 @@
   <p:clrMapOvr>
     <a:masterClrMapping/>
   </p:clrMapOvr>
+  <p:timing>
+    <p:tnLst>
+      <p:par>
+        <p:cTn id="1" dur="indefinite" restart="never" nodeType="tmRoot"/>
+      </p:par>
+    </p:tnLst>
+  </p:timing>
 </p:sld>
 </file>
 
@@ -5905,6 +5954,13 @@
   <p:clrMapOvr>
     <a:masterClrMapping/>
   </p:clrMapOvr>
+  <p:timing>
+    <p:tnLst>
+      <p:par>
+        <p:cTn id="1" dur="indefinite" restart="never" nodeType="tmRoot"/>
+      </p:par>
+    </p:tnLst>
+  </p:timing>
 </p:sld>
 </file>
 
@@ -6030,6 +6086,13 @@
   <p:clrMapOvr>
     <a:masterClrMapping/>
   </p:clrMapOvr>
+  <p:timing>
+    <p:tnLst>
+      <p:par>
+        <p:cTn id="1" dur="indefinite" restart="never" nodeType="tmRoot"/>
+      </p:par>
+    </p:tnLst>
+  </p:timing>
 </p:sld>
 </file>
 
@@ -6163,6 +6226,13 @@
   <p:clrMapOvr>
     <a:masterClrMapping/>
   </p:clrMapOvr>
+  <p:timing>
+    <p:tnLst>
+      <p:par>
+        <p:cTn id="1" dur="indefinite" restart="never" nodeType="tmRoot"/>
+      </p:par>
+    </p:tnLst>
+  </p:timing>
 </p:sld>
 </file>
 
@@ -6359,6 +6429,13 @@
   <p:clrMapOvr>
     <a:masterClrMapping/>
   </p:clrMapOvr>
+  <p:timing>
+    <p:tnLst>
+      <p:par>
+        <p:cTn id="1" dur="indefinite" restart="never" nodeType="tmRoot"/>
+      </p:par>
+    </p:tnLst>
+  </p:timing>
 </p:sld>
 </file>
 
@@ -6535,6 +6612,13 @@
   <p:clrMapOvr>
     <a:masterClrMapping/>
   </p:clrMapOvr>
+  <p:timing>
+    <p:tnLst>
+      <p:par>
+        <p:cTn id="1" dur="indefinite" restart="never" nodeType="tmRoot"/>
+      </p:par>
+    </p:tnLst>
+  </p:timing>
 </p:sld>
 </file>
 

</xml_diff>